<commit_message>
o updated slides to remove time/date...
</commit_message>
<xml_diff>
--- a/slides/00-course-intro.pptx
+++ b/slides/00-course-intro.pptx
@@ -246,7 +246,7 @@
             <a:fld id="{B2B2FCEE-F6CE-4B8D-9B1B-4676A6BB0AFB}" type="datetimeFigureOut">
               <a:rPr lang="en-US" smtClean="0"/>
               <a:pPr/>
-              <a:t>9/7/2020</a:t>
+              <a:t>9/8/2020</a:t>
             </a:fld>
             <a:endParaRPr lang="en-US"/>
           </a:p>
@@ -413,7 +413,7 @@
             <a:fld id="{E1764091-E49F-4F14-951E-D59F416DB54B}" type="datetimeFigureOut">
               <a:rPr lang="en-US" smtClean="0"/>
               <a:pPr/>
-              <a:t>9/7/2020</a:t>
+              <a:t>9/8/2020</a:t>
             </a:fld>
             <a:endParaRPr lang="en-US" dirty="0"/>
           </a:p>
@@ -751,7 +751,7 @@
             <a:fld id="{4D70F4DB-2E8C-4365-A880-E48CDA094176}" type="datetime3">
               <a:rPr lang="en-US" smtClean="0"/>
               <a:pPr/>
-              <a:t>7 September 2020</a:t>
+              <a:t>8 September 2020</a:t>
             </a:fld>
             <a:endParaRPr lang="en-US" smtClean="0"/>
           </a:p>
@@ -4618,21 +4618,11 @@
             <a:pPr lvl="1"/>
             <a:r>
               <a:rPr lang="en-US" sz="2000" dirty="0" smtClean="0"/>
-              <a:t>Date: 10 Sept - 26 Sept</a:t>
-            </a:r>
-          </a:p>
-          <a:p>
-            <a:pPr lvl="1"/>
+              <a:t>Location</a:t>
+            </a:r>
             <a:r>
               <a:rPr lang="en-US" sz="2000" dirty="0" smtClean="0"/>
-              <a:t>Time: 0800-1100</a:t>
-            </a:r>
-          </a:p>
-          <a:p>
-            <a:pPr lvl="1"/>
-            <a:r>
-              <a:rPr lang="en-US" sz="2000" dirty="0" smtClean="0"/>
-              <a:t>Location: </a:t>
+              <a:t>: </a:t>
             </a:r>
             <a:r>
               <a:rPr lang="en-US" sz="2000" dirty="0" err="1" smtClean="0"/>

</xml_diff>

<commit_message>
o updates for Summer 2023...
</commit_message>
<xml_diff>
--- a/slides/00-course-intro.pptx
+++ b/slides/00-course-intro.pptx
@@ -240,7 +240,7 @@
             <a:fld id="{B2B2FCEE-F6CE-4B8D-9B1B-4676A6BB0AFB}" type="datetimeFigureOut">
               <a:rPr lang="en-US" smtClean="0"/>
               <a:pPr/>
-              <a:t>9/13/2021</a:t>
+              <a:t>9/6/2023</a:t>
             </a:fld>
             <a:endParaRPr lang="en-US"/>
           </a:p>
@@ -407,7 +407,7 @@
             <a:fld id="{E1764091-E49F-4F14-951E-D59F416DB54B}" type="datetimeFigureOut">
               <a:rPr lang="en-US" smtClean="0"/>
               <a:pPr/>
-              <a:t>9/13/2021</a:t>
+              <a:t>9/6/2023</a:t>
             </a:fld>
             <a:endParaRPr lang="en-US" dirty="0"/>
           </a:p>
@@ -744,7 +744,7 @@
             <a:fld id="{4D70F4DB-2E8C-4365-A880-E48CDA094176}" type="datetime3">
               <a:rPr lang="en-US" smtClean="0"/>
               <a:pPr/>
-              <a:t>13 September 2021</a:t>
+              <a:t>6 September 2023</a:t>
             </a:fld>
             <a:endParaRPr lang="en-US"/>
           </a:p>
@@ -2320,7 +2320,7 @@
               <a:rPr lang="en-US" sz="1600" dirty="0">
                 <a:hlinkClick r:id="rId3"/>
               </a:rPr>
-              <a:t>http://www.tutorialspoint.com/java/index.htm</a:t>
+              <a:t>https://www.w3schools.com/java/</a:t>
             </a:r>
             <a:endParaRPr lang="en-US" sz="1600" dirty="0"/>
           </a:p>
@@ -3620,14 +3620,24 @@
             </a:r>
             <a:r>
               <a:rPr lang="en-US" sz="2000" dirty="0"/>
-              <a:t> 642, Rm 203 (Across from Gecko CCR Lab)</a:t>
+              <a:t> 642, Rm 203 (Prefer to message me on MS Teams / Email)</a:t>
             </a:r>
           </a:p>
           <a:p>
             <a:pPr lvl="1"/>
             <a:r>
               <a:rPr lang="en-US" sz="2000" dirty="0"/>
-              <a:t>Phone: x4395</a:t>
+              <a:t>Phone: </a:t>
+            </a:r>
+            <a:r>
+              <a:rPr lang="en-US" sz="2000" dirty="0">
+                <a:hlinkClick r:id="rId3"/>
+              </a:rPr>
+              <a:t>scott.nykl@au.af.edu</a:t>
+            </a:r>
+            <a:r>
+              <a:rPr lang="en-US" sz="2000" dirty="0"/>
+              <a:t> / MS Teams</a:t>
             </a:r>
           </a:p>
           <a:p>

</xml_diff>